<commit_message>
Implementation - merge and pbd sections
</commit_message>
<xml_diff>
--- a/fig/walkthrough.pptx
+++ b/fig/walkthrough.pptx
@@ -6,6 +6,8 @@
   </p:sldMasterIdLst>
   <p:sldIdLst>
     <p:sldId id="256" r:id="rId2"/>
+    <p:sldId id="257" r:id="rId3"/>
+    <p:sldId id="258" r:id="rId4"/>
   </p:sldIdLst>
   <p:sldSz cx="12192000" cy="6858000"/>
   <p:notesSz cx="6858000" cy="9144000"/>
@@ -104,6 +106,11 @@
       </a:defRPr>
     </a:lvl9pPr>
   </p:defaultTextStyle>
+  <p:extLst>
+    <p:ext uri="{EFAFB233-063F-42B5-8137-9DF3F51BA10A}">
+      <p15:sldGuideLst xmlns:p15="http://schemas.microsoft.com/office/powerpoint/2012/main"/>
+    </p:ext>
+  </p:extLst>
 </p:presentation>
 </file>
 
@@ -256,7 +263,7 @@
           <a:p>
             <a:fld id="{BC7C423D-9102-402A-A9CF-B9852A18F701}" type="datetimeFigureOut">
               <a:rPr lang="en-GB" smtClean="0"/>
-              <a:t>03/11/2024</a:t>
+              <a:t>08/11/2024</a:t>
             </a:fld>
             <a:endParaRPr lang="en-GB"/>
           </a:p>
@@ -456,7 +463,7 @@
           <a:p>
             <a:fld id="{BC7C423D-9102-402A-A9CF-B9852A18F701}" type="datetimeFigureOut">
               <a:rPr lang="en-GB" smtClean="0"/>
-              <a:t>03/11/2024</a:t>
+              <a:t>08/11/2024</a:t>
             </a:fld>
             <a:endParaRPr lang="en-GB"/>
           </a:p>
@@ -666,7 +673,7 @@
           <a:p>
             <a:fld id="{BC7C423D-9102-402A-A9CF-B9852A18F701}" type="datetimeFigureOut">
               <a:rPr lang="en-GB" smtClean="0"/>
-              <a:t>03/11/2024</a:t>
+              <a:t>08/11/2024</a:t>
             </a:fld>
             <a:endParaRPr lang="en-GB"/>
           </a:p>
@@ -866,7 +873,7 @@
           <a:p>
             <a:fld id="{BC7C423D-9102-402A-A9CF-B9852A18F701}" type="datetimeFigureOut">
               <a:rPr lang="en-GB" smtClean="0"/>
-              <a:t>03/11/2024</a:t>
+              <a:t>08/11/2024</a:t>
             </a:fld>
             <a:endParaRPr lang="en-GB"/>
           </a:p>
@@ -1142,7 +1149,7 @@
           <a:p>
             <a:fld id="{BC7C423D-9102-402A-A9CF-B9852A18F701}" type="datetimeFigureOut">
               <a:rPr lang="en-GB" smtClean="0"/>
-              <a:t>03/11/2024</a:t>
+              <a:t>08/11/2024</a:t>
             </a:fld>
             <a:endParaRPr lang="en-GB"/>
           </a:p>
@@ -1410,7 +1417,7 @@
           <a:p>
             <a:fld id="{BC7C423D-9102-402A-A9CF-B9852A18F701}" type="datetimeFigureOut">
               <a:rPr lang="en-GB" smtClean="0"/>
-              <a:t>03/11/2024</a:t>
+              <a:t>08/11/2024</a:t>
             </a:fld>
             <a:endParaRPr lang="en-GB"/>
           </a:p>
@@ -1825,7 +1832,7 @@
           <a:p>
             <a:fld id="{BC7C423D-9102-402A-A9CF-B9852A18F701}" type="datetimeFigureOut">
               <a:rPr lang="en-GB" smtClean="0"/>
-              <a:t>03/11/2024</a:t>
+              <a:t>08/11/2024</a:t>
             </a:fld>
             <a:endParaRPr lang="en-GB"/>
           </a:p>
@@ -1967,7 +1974,7 @@
           <a:p>
             <a:fld id="{BC7C423D-9102-402A-A9CF-B9852A18F701}" type="datetimeFigureOut">
               <a:rPr lang="en-GB" smtClean="0"/>
-              <a:t>03/11/2024</a:t>
+              <a:t>08/11/2024</a:t>
             </a:fld>
             <a:endParaRPr lang="en-GB"/>
           </a:p>
@@ -2080,7 +2087,7 @@
           <a:p>
             <a:fld id="{BC7C423D-9102-402A-A9CF-B9852A18F701}" type="datetimeFigureOut">
               <a:rPr lang="en-GB" smtClean="0"/>
-              <a:t>03/11/2024</a:t>
+              <a:t>08/11/2024</a:t>
             </a:fld>
             <a:endParaRPr lang="en-GB"/>
           </a:p>
@@ -2393,7 +2400,7 @@
           <a:p>
             <a:fld id="{BC7C423D-9102-402A-A9CF-B9852A18F701}" type="datetimeFigureOut">
               <a:rPr lang="en-GB" smtClean="0"/>
-              <a:t>03/11/2024</a:t>
+              <a:t>08/11/2024</a:t>
             </a:fld>
             <a:endParaRPr lang="en-GB"/>
           </a:p>
@@ -2682,7 +2689,7 @@
           <a:p>
             <a:fld id="{BC7C423D-9102-402A-A9CF-B9852A18F701}" type="datetimeFigureOut">
               <a:rPr lang="en-GB" smtClean="0"/>
-              <a:t>03/11/2024</a:t>
+              <a:t>08/11/2024</a:t>
             </a:fld>
             <a:endParaRPr lang="en-GB"/>
           </a:p>
@@ -2925,7 +2932,7 @@
           <a:p>
             <a:fld id="{BC7C423D-9102-402A-A9CF-B9852A18F701}" type="datetimeFigureOut">
               <a:rPr lang="en-GB" smtClean="0"/>
-              <a:t>03/11/2024</a:t>
+              <a:t>08/11/2024</a:t>
             </a:fld>
             <a:endParaRPr lang="en-GB"/>
           </a:p>
@@ -4397,6 +4404,709 @@
 </p:sld>
 </file>
 
+<file path=ppt/slides/slide2.xml><?xml version="1.0" encoding="utf-8"?>
+<p:sld xmlns:a="http://schemas.openxmlformats.org/drawingml/2006/main" xmlns:r="http://schemas.openxmlformats.org/officeDocument/2006/relationships" xmlns:p="http://schemas.openxmlformats.org/presentationml/2006/main">
+  <p:cSld>
+    <p:spTree>
+      <p:nvGrpSpPr>
+        <p:cNvPr id="1" name=""/>
+        <p:cNvGrpSpPr/>
+        <p:nvPr/>
+      </p:nvGrpSpPr>
+      <p:grpSpPr>
+        <a:xfrm>
+          <a:off x="0" y="0"/>
+          <a:ext cx="0" cy="0"/>
+          <a:chOff x="0" y="0"/>
+          <a:chExt cx="0" cy="0"/>
+        </a:xfrm>
+      </p:grpSpPr>
+      <p:pic>
+        <p:nvPicPr>
+          <p:cNvPr id="5" name="Picture 4">
+            <a:extLst>
+              <a:ext uri="{FF2B5EF4-FFF2-40B4-BE49-F238E27FC236}">
+                <a16:creationId xmlns:a16="http://schemas.microsoft.com/office/drawing/2014/main" id="{56627C3E-4355-C182-125B-2A108BEAA1C2}"/>
+              </a:ext>
+            </a:extLst>
+          </p:cNvPr>
+          <p:cNvPicPr>
+            <a:picLocks noChangeAspect="1"/>
+          </p:cNvPicPr>
+          <p:nvPr/>
+        </p:nvPicPr>
+        <p:blipFill>
+          <a:blip r:embed="rId2"/>
+          <a:stretch>
+            <a:fillRect/>
+          </a:stretch>
+        </p:blipFill>
+        <p:spPr>
+          <a:xfrm>
+            <a:off x="1100574" y="459739"/>
+            <a:ext cx="3873699" cy="1454225"/>
+          </a:xfrm>
+          <a:prstGeom prst="rect">
+            <a:avLst/>
+          </a:prstGeom>
+        </p:spPr>
+      </p:pic>
+      <p:pic>
+        <p:nvPicPr>
+          <p:cNvPr id="7" name="Picture 6">
+            <a:extLst>
+              <a:ext uri="{FF2B5EF4-FFF2-40B4-BE49-F238E27FC236}">
+                <a16:creationId xmlns:a16="http://schemas.microsoft.com/office/drawing/2014/main" id="{D1DA77CF-D5E0-DBD4-F6F3-2031624E3372}"/>
+              </a:ext>
+            </a:extLst>
+          </p:cNvPr>
+          <p:cNvPicPr>
+            <a:picLocks noChangeAspect="1"/>
+          </p:cNvPicPr>
+          <p:nvPr/>
+        </p:nvPicPr>
+        <p:blipFill>
+          <a:blip r:embed="rId3"/>
+          <a:stretch>
+            <a:fillRect/>
+          </a:stretch>
+        </p:blipFill>
+        <p:spPr>
+          <a:xfrm>
+            <a:off x="1158349" y="2600282"/>
+            <a:ext cx="4038808" cy="1657435"/>
+          </a:xfrm>
+          <a:prstGeom prst="rect">
+            <a:avLst/>
+          </a:prstGeom>
+        </p:spPr>
+      </p:pic>
+      <p:pic>
+        <p:nvPicPr>
+          <p:cNvPr id="9" name="Picture 8">
+            <a:extLst>
+              <a:ext uri="{FF2B5EF4-FFF2-40B4-BE49-F238E27FC236}">
+                <a16:creationId xmlns:a16="http://schemas.microsoft.com/office/drawing/2014/main" id="{BC08D6A4-BC42-CC99-AAC1-7B5DA590A2C3}"/>
+              </a:ext>
+            </a:extLst>
+          </p:cNvPr>
+          <p:cNvPicPr>
+            <a:picLocks noChangeAspect="1"/>
+          </p:cNvPicPr>
+          <p:nvPr/>
+        </p:nvPicPr>
+        <p:blipFill>
+          <a:blip r:embed="rId4"/>
+          <a:stretch>
+            <a:fillRect/>
+          </a:stretch>
+        </p:blipFill>
+        <p:spPr>
+          <a:xfrm>
+            <a:off x="5739844" y="459739"/>
+            <a:ext cx="3600635" cy="1905098"/>
+          </a:xfrm>
+          <a:prstGeom prst="rect">
+            <a:avLst/>
+          </a:prstGeom>
+        </p:spPr>
+      </p:pic>
+      <p:pic>
+        <p:nvPicPr>
+          <p:cNvPr id="11" name="Picture 10">
+            <a:extLst>
+              <a:ext uri="{FF2B5EF4-FFF2-40B4-BE49-F238E27FC236}">
+                <a16:creationId xmlns:a16="http://schemas.microsoft.com/office/drawing/2014/main" id="{B56EE257-3A19-82A8-FAE2-38DD8B6FD523}"/>
+              </a:ext>
+            </a:extLst>
+          </p:cNvPr>
+          <p:cNvPicPr>
+            <a:picLocks noChangeAspect="1"/>
+          </p:cNvPicPr>
+          <p:nvPr/>
+        </p:nvPicPr>
+        <p:blipFill>
+          <a:blip r:embed="rId5"/>
+          <a:stretch>
+            <a:fillRect/>
+          </a:stretch>
+        </p:blipFill>
+        <p:spPr>
+          <a:xfrm>
+            <a:off x="5739844" y="2553473"/>
+            <a:ext cx="3810196" cy="2216264"/>
+          </a:xfrm>
+          <a:prstGeom prst="rect">
+            <a:avLst/>
+          </a:prstGeom>
+        </p:spPr>
+      </p:pic>
+      <p:sp>
+        <p:nvSpPr>
+          <p:cNvPr id="12" name="Oval 11">
+            <a:extLst>
+              <a:ext uri="{FF2B5EF4-FFF2-40B4-BE49-F238E27FC236}">
+                <a16:creationId xmlns:a16="http://schemas.microsoft.com/office/drawing/2014/main" id="{FDB2DF17-D914-EB6A-814F-312219235CB5}"/>
+              </a:ext>
+            </a:extLst>
+          </p:cNvPr>
+          <p:cNvSpPr/>
+          <p:nvPr/>
+        </p:nvSpPr>
+        <p:spPr>
+          <a:xfrm>
+            <a:off x="707915" y="582888"/>
+            <a:ext cx="395416" cy="395416"/>
+          </a:xfrm>
+          <a:prstGeom prst="ellipse">
+            <a:avLst/>
+          </a:prstGeom>
+          <a:solidFill>
+            <a:srgbClr val="831086"/>
+          </a:solidFill>
+          <a:ln>
+            <a:noFill/>
+          </a:ln>
+        </p:spPr>
+        <p:style>
+          <a:lnRef idx="2">
+            <a:schemeClr val="accent1">
+              <a:shade val="15000"/>
+            </a:schemeClr>
+          </a:lnRef>
+          <a:fillRef idx="1">
+            <a:schemeClr val="accent1"/>
+          </a:fillRef>
+          <a:effectRef idx="0">
+            <a:schemeClr val="accent1"/>
+          </a:effectRef>
+          <a:fontRef idx="minor">
+            <a:schemeClr val="lt1"/>
+          </a:fontRef>
+        </p:style>
+        <p:txBody>
+          <a:bodyPr rtlCol="0" anchor="ctr"/>
+          <a:lstStyle/>
+          <a:p>
+            <a:pPr algn="ctr"/>
+            <a:r>
+              <a:rPr lang="en-US" dirty="0">
+                <a:latin typeface="Roboto Black" panose="02000000000000000000" pitchFamily="2" charset="0"/>
+                <a:ea typeface="Roboto Black" panose="02000000000000000000" pitchFamily="2" charset="0"/>
+              </a:rPr>
+              <a:t>A</a:t>
+            </a:r>
+            <a:endParaRPr lang="en-GB" dirty="0">
+              <a:latin typeface="Roboto Black" panose="02000000000000000000" pitchFamily="2" charset="0"/>
+              <a:ea typeface="Roboto Black" panose="02000000000000000000" pitchFamily="2" charset="0"/>
+            </a:endParaRPr>
+          </a:p>
+        </p:txBody>
+      </p:sp>
+      <p:sp>
+        <p:nvSpPr>
+          <p:cNvPr id="13" name="Oval 12">
+            <a:extLst>
+              <a:ext uri="{FF2B5EF4-FFF2-40B4-BE49-F238E27FC236}">
+                <a16:creationId xmlns:a16="http://schemas.microsoft.com/office/drawing/2014/main" id="{E9C444CD-7ABE-5270-CFFC-453889F063F4}"/>
+              </a:ext>
+            </a:extLst>
+          </p:cNvPr>
+          <p:cNvSpPr/>
+          <p:nvPr/>
+        </p:nvSpPr>
+        <p:spPr>
+          <a:xfrm>
+            <a:off x="705158" y="2635604"/>
+            <a:ext cx="395416" cy="395416"/>
+          </a:xfrm>
+          <a:prstGeom prst="ellipse">
+            <a:avLst/>
+          </a:prstGeom>
+          <a:solidFill>
+            <a:srgbClr val="831086"/>
+          </a:solidFill>
+          <a:ln>
+            <a:noFill/>
+          </a:ln>
+        </p:spPr>
+        <p:style>
+          <a:lnRef idx="2">
+            <a:schemeClr val="accent1">
+              <a:shade val="15000"/>
+            </a:schemeClr>
+          </a:lnRef>
+          <a:fillRef idx="1">
+            <a:schemeClr val="accent1"/>
+          </a:fillRef>
+          <a:effectRef idx="0">
+            <a:schemeClr val="accent1"/>
+          </a:effectRef>
+          <a:fontRef idx="minor">
+            <a:schemeClr val="lt1"/>
+          </a:fontRef>
+        </p:style>
+        <p:txBody>
+          <a:bodyPr rtlCol="0" anchor="ctr"/>
+          <a:lstStyle/>
+          <a:p>
+            <a:pPr algn="ctr"/>
+            <a:r>
+              <a:rPr lang="en-US" dirty="0">
+                <a:latin typeface="Roboto Black" panose="02000000000000000000" pitchFamily="2" charset="0"/>
+                <a:ea typeface="Roboto Black" panose="02000000000000000000" pitchFamily="2" charset="0"/>
+              </a:rPr>
+              <a:t>C</a:t>
+            </a:r>
+            <a:endParaRPr lang="en-GB" dirty="0">
+              <a:latin typeface="Roboto Black" panose="02000000000000000000" pitchFamily="2" charset="0"/>
+              <a:ea typeface="Roboto Black" panose="02000000000000000000" pitchFamily="2" charset="0"/>
+            </a:endParaRPr>
+          </a:p>
+        </p:txBody>
+      </p:sp>
+      <p:sp>
+        <p:nvSpPr>
+          <p:cNvPr id="14" name="Oval 13">
+            <a:extLst>
+              <a:ext uri="{FF2B5EF4-FFF2-40B4-BE49-F238E27FC236}">
+                <a16:creationId xmlns:a16="http://schemas.microsoft.com/office/drawing/2014/main" id="{3EC1DCD3-2751-2399-6405-0C58B1EFEB8B}"/>
+              </a:ext>
+            </a:extLst>
+          </p:cNvPr>
+          <p:cNvSpPr/>
+          <p:nvPr/>
+        </p:nvSpPr>
+        <p:spPr>
+          <a:xfrm>
+            <a:off x="5286653" y="582888"/>
+            <a:ext cx="395416" cy="395416"/>
+          </a:xfrm>
+          <a:prstGeom prst="ellipse">
+            <a:avLst/>
+          </a:prstGeom>
+          <a:solidFill>
+            <a:srgbClr val="831086"/>
+          </a:solidFill>
+          <a:ln>
+            <a:noFill/>
+          </a:ln>
+        </p:spPr>
+        <p:style>
+          <a:lnRef idx="2">
+            <a:schemeClr val="accent1">
+              <a:shade val="15000"/>
+            </a:schemeClr>
+          </a:lnRef>
+          <a:fillRef idx="1">
+            <a:schemeClr val="accent1"/>
+          </a:fillRef>
+          <a:effectRef idx="0">
+            <a:schemeClr val="accent1"/>
+          </a:effectRef>
+          <a:fontRef idx="minor">
+            <a:schemeClr val="lt1"/>
+          </a:fontRef>
+        </p:style>
+        <p:txBody>
+          <a:bodyPr rtlCol="0" anchor="ctr"/>
+          <a:lstStyle/>
+          <a:p>
+            <a:pPr algn="ctr"/>
+            <a:r>
+              <a:rPr lang="en-US" dirty="0">
+                <a:latin typeface="Roboto Black" panose="02000000000000000000" pitchFamily="2" charset="0"/>
+                <a:ea typeface="Roboto Black" panose="02000000000000000000" pitchFamily="2" charset="0"/>
+              </a:rPr>
+              <a:t>B</a:t>
+            </a:r>
+            <a:endParaRPr lang="en-GB" dirty="0">
+              <a:latin typeface="Roboto Black" panose="02000000000000000000" pitchFamily="2" charset="0"/>
+              <a:ea typeface="Roboto Black" panose="02000000000000000000" pitchFamily="2" charset="0"/>
+            </a:endParaRPr>
+          </a:p>
+        </p:txBody>
+      </p:sp>
+      <p:sp>
+        <p:nvSpPr>
+          <p:cNvPr id="15" name="Oval 14">
+            <a:extLst>
+              <a:ext uri="{FF2B5EF4-FFF2-40B4-BE49-F238E27FC236}">
+                <a16:creationId xmlns:a16="http://schemas.microsoft.com/office/drawing/2014/main" id="{9B5E57BD-7E8A-D26F-FC29-388FC0481AAA}"/>
+              </a:ext>
+            </a:extLst>
+          </p:cNvPr>
+          <p:cNvSpPr/>
+          <p:nvPr/>
+        </p:nvSpPr>
+        <p:spPr>
+          <a:xfrm>
+            <a:off x="5286653" y="2635604"/>
+            <a:ext cx="395416" cy="395416"/>
+          </a:xfrm>
+          <a:prstGeom prst="ellipse">
+            <a:avLst/>
+          </a:prstGeom>
+          <a:solidFill>
+            <a:srgbClr val="831086"/>
+          </a:solidFill>
+          <a:ln>
+            <a:noFill/>
+          </a:ln>
+        </p:spPr>
+        <p:style>
+          <a:lnRef idx="2">
+            <a:schemeClr val="accent1">
+              <a:shade val="15000"/>
+            </a:schemeClr>
+          </a:lnRef>
+          <a:fillRef idx="1">
+            <a:schemeClr val="accent1"/>
+          </a:fillRef>
+          <a:effectRef idx="0">
+            <a:schemeClr val="accent1"/>
+          </a:effectRef>
+          <a:fontRef idx="minor">
+            <a:schemeClr val="lt1"/>
+          </a:fontRef>
+        </p:style>
+        <p:txBody>
+          <a:bodyPr rtlCol="0" anchor="ctr"/>
+          <a:lstStyle/>
+          <a:p>
+            <a:pPr algn="ctr"/>
+            <a:r>
+              <a:rPr lang="en-US" dirty="0">
+                <a:latin typeface="Roboto Black" panose="02000000000000000000" pitchFamily="2" charset="0"/>
+                <a:ea typeface="Roboto Black" panose="02000000000000000000" pitchFamily="2" charset="0"/>
+              </a:rPr>
+              <a:t>D</a:t>
+            </a:r>
+            <a:endParaRPr lang="en-GB" dirty="0">
+              <a:latin typeface="Roboto Black" panose="02000000000000000000" pitchFamily="2" charset="0"/>
+              <a:ea typeface="Roboto Black" panose="02000000000000000000" pitchFamily="2" charset="0"/>
+            </a:endParaRPr>
+          </a:p>
+        </p:txBody>
+      </p:sp>
+    </p:spTree>
+    <p:extLst>
+      <p:ext uri="{BB962C8B-B14F-4D97-AF65-F5344CB8AC3E}">
+        <p14:creationId xmlns:p14="http://schemas.microsoft.com/office/powerpoint/2010/main" val="1088317385"/>
+      </p:ext>
+    </p:extLst>
+  </p:cSld>
+  <p:clrMapOvr>
+    <a:masterClrMapping/>
+  </p:clrMapOvr>
+</p:sld>
+</file>
+
+<file path=ppt/slides/slide3.xml><?xml version="1.0" encoding="utf-8"?>
+<p:sld xmlns:a="http://schemas.openxmlformats.org/drawingml/2006/main" xmlns:r="http://schemas.openxmlformats.org/officeDocument/2006/relationships" xmlns:p="http://schemas.openxmlformats.org/presentationml/2006/main">
+  <p:cSld>
+    <p:spTree>
+      <p:nvGrpSpPr>
+        <p:cNvPr id="1" name=""/>
+        <p:cNvGrpSpPr/>
+        <p:nvPr/>
+      </p:nvGrpSpPr>
+      <p:grpSpPr>
+        <a:xfrm>
+          <a:off x="0" y="0"/>
+          <a:ext cx="0" cy="0"/>
+          <a:chOff x="0" y="0"/>
+          <a:chExt cx="0" cy="0"/>
+        </a:xfrm>
+      </p:grpSpPr>
+      <p:sp>
+        <p:nvSpPr>
+          <p:cNvPr id="12" name="Oval 11">
+            <a:extLst>
+              <a:ext uri="{FF2B5EF4-FFF2-40B4-BE49-F238E27FC236}">
+                <a16:creationId xmlns:a16="http://schemas.microsoft.com/office/drawing/2014/main" id="{8E2FB2EF-1C5B-060A-238A-7EE15D58239D}"/>
+              </a:ext>
+            </a:extLst>
+          </p:cNvPr>
+          <p:cNvSpPr/>
+          <p:nvPr/>
+        </p:nvSpPr>
+        <p:spPr>
+          <a:xfrm>
+            <a:off x="50862" y="46294"/>
+            <a:ext cx="395416" cy="395416"/>
+          </a:xfrm>
+          <a:prstGeom prst="ellipse">
+            <a:avLst/>
+          </a:prstGeom>
+          <a:solidFill>
+            <a:srgbClr val="831086"/>
+          </a:solidFill>
+          <a:ln>
+            <a:noFill/>
+          </a:ln>
+        </p:spPr>
+        <p:style>
+          <a:lnRef idx="2">
+            <a:schemeClr val="accent1">
+              <a:shade val="15000"/>
+            </a:schemeClr>
+          </a:lnRef>
+          <a:fillRef idx="1">
+            <a:schemeClr val="accent1"/>
+          </a:fillRef>
+          <a:effectRef idx="0">
+            <a:schemeClr val="accent1"/>
+          </a:effectRef>
+          <a:fontRef idx="minor">
+            <a:schemeClr val="lt1"/>
+          </a:fontRef>
+        </p:style>
+        <p:txBody>
+          <a:bodyPr rtlCol="0" anchor="ctr"/>
+          <a:lstStyle/>
+          <a:p>
+            <a:pPr algn="ctr"/>
+            <a:r>
+              <a:rPr lang="en-US" dirty="0">
+                <a:latin typeface="Roboto Black" panose="02000000000000000000" pitchFamily="2" charset="0"/>
+                <a:ea typeface="Roboto Black" panose="02000000000000000000" pitchFamily="2" charset="0"/>
+              </a:rPr>
+              <a:t>1</a:t>
+            </a:r>
+            <a:endParaRPr lang="en-GB" dirty="0">
+              <a:latin typeface="Roboto Black" panose="02000000000000000000" pitchFamily="2" charset="0"/>
+              <a:ea typeface="Roboto Black" panose="02000000000000000000" pitchFamily="2" charset="0"/>
+            </a:endParaRPr>
+          </a:p>
+        </p:txBody>
+      </p:sp>
+      <p:sp>
+        <p:nvSpPr>
+          <p:cNvPr id="13" name="Oval 12">
+            <a:extLst>
+              <a:ext uri="{FF2B5EF4-FFF2-40B4-BE49-F238E27FC236}">
+                <a16:creationId xmlns:a16="http://schemas.microsoft.com/office/drawing/2014/main" id="{DBFD5ABD-56E5-7379-7DD8-9ECD9495553D}"/>
+              </a:ext>
+            </a:extLst>
+          </p:cNvPr>
+          <p:cNvSpPr/>
+          <p:nvPr/>
+        </p:nvSpPr>
+        <p:spPr>
+          <a:xfrm>
+            <a:off x="50862" y="2749452"/>
+            <a:ext cx="395416" cy="395416"/>
+          </a:xfrm>
+          <a:prstGeom prst="ellipse">
+            <a:avLst/>
+          </a:prstGeom>
+          <a:solidFill>
+            <a:srgbClr val="831086"/>
+          </a:solidFill>
+          <a:ln>
+            <a:noFill/>
+          </a:ln>
+        </p:spPr>
+        <p:style>
+          <a:lnRef idx="2">
+            <a:schemeClr val="accent1">
+              <a:shade val="15000"/>
+            </a:schemeClr>
+          </a:lnRef>
+          <a:fillRef idx="1">
+            <a:schemeClr val="accent1"/>
+          </a:fillRef>
+          <a:effectRef idx="0">
+            <a:schemeClr val="accent1"/>
+          </a:effectRef>
+          <a:fontRef idx="minor">
+            <a:schemeClr val="lt1"/>
+          </a:fontRef>
+        </p:style>
+        <p:txBody>
+          <a:bodyPr rtlCol="0" anchor="ctr"/>
+          <a:lstStyle/>
+          <a:p>
+            <a:pPr algn="ctr"/>
+            <a:r>
+              <a:rPr lang="en-US" dirty="0">
+                <a:latin typeface="Roboto Black" panose="02000000000000000000" pitchFamily="2" charset="0"/>
+                <a:ea typeface="Roboto Black" panose="02000000000000000000" pitchFamily="2" charset="0"/>
+              </a:rPr>
+              <a:t>2</a:t>
+            </a:r>
+            <a:endParaRPr lang="en-GB" dirty="0">
+              <a:latin typeface="Roboto Black" panose="02000000000000000000" pitchFamily="2" charset="0"/>
+              <a:ea typeface="Roboto Black" panose="02000000000000000000" pitchFamily="2" charset="0"/>
+            </a:endParaRPr>
+          </a:p>
+        </p:txBody>
+      </p:sp>
+      <p:sp>
+        <p:nvSpPr>
+          <p:cNvPr id="14" name="Oval 13">
+            <a:extLst>
+              <a:ext uri="{FF2B5EF4-FFF2-40B4-BE49-F238E27FC236}">
+                <a16:creationId xmlns:a16="http://schemas.microsoft.com/office/drawing/2014/main" id="{91D68131-DB97-89AD-6B77-98CAE16E257A}"/>
+              </a:ext>
+            </a:extLst>
+          </p:cNvPr>
+          <p:cNvSpPr/>
+          <p:nvPr/>
+        </p:nvSpPr>
+        <p:spPr>
+          <a:xfrm>
+            <a:off x="4190232" y="46294"/>
+            <a:ext cx="395416" cy="395416"/>
+          </a:xfrm>
+          <a:prstGeom prst="ellipse">
+            <a:avLst/>
+          </a:prstGeom>
+          <a:solidFill>
+            <a:srgbClr val="831086"/>
+          </a:solidFill>
+          <a:ln>
+            <a:noFill/>
+          </a:ln>
+        </p:spPr>
+        <p:style>
+          <a:lnRef idx="2">
+            <a:schemeClr val="accent1">
+              <a:shade val="15000"/>
+            </a:schemeClr>
+          </a:lnRef>
+          <a:fillRef idx="1">
+            <a:schemeClr val="accent1"/>
+          </a:fillRef>
+          <a:effectRef idx="0">
+            <a:schemeClr val="accent1"/>
+          </a:effectRef>
+          <a:fontRef idx="minor">
+            <a:schemeClr val="lt1"/>
+          </a:fontRef>
+        </p:style>
+        <p:txBody>
+          <a:bodyPr rtlCol="0" anchor="ctr"/>
+          <a:lstStyle/>
+          <a:p>
+            <a:pPr algn="ctr"/>
+            <a:r>
+              <a:rPr lang="en-US" dirty="0">
+                <a:latin typeface="Roboto Black" panose="02000000000000000000" pitchFamily="2" charset="0"/>
+                <a:ea typeface="Roboto Black" panose="02000000000000000000" pitchFamily="2" charset="0"/>
+              </a:rPr>
+              <a:t>3</a:t>
+            </a:r>
+            <a:endParaRPr lang="en-GB" dirty="0">
+              <a:latin typeface="Roboto Black" panose="02000000000000000000" pitchFamily="2" charset="0"/>
+              <a:ea typeface="Roboto Black" panose="02000000000000000000" pitchFamily="2" charset="0"/>
+            </a:endParaRPr>
+          </a:p>
+        </p:txBody>
+      </p:sp>
+      <p:pic>
+        <p:nvPicPr>
+          <p:cNvPr id="20" name="Picture 19">
+            <a:extLst>
+              <a:ext uri="{FF2B5EF4-FFF2-40B4-BE49-F238E27FC236}">
+                <a16:creationId xmlns:a16="http://schemas.microsoft.com/office/drawing/2014/main" id="{D7394D7D-1A6F-8C4D-5122-506E533402DD}"/>
+              </a:ext>
+            </a:extLst>
+          </p:cNvPr>
+          <p:cNvPicPr>
+            <a:picLocks noChangeAspect="1"/>
+          </p:cNvPicPr>
+          <p:nvPr/>
+        </p:nvPicPr>
+        <p:blipFill>
+          <a:blip r:embed="rId2"/>
+          <a:srcRect t="9274" b="1423"/>
+          <a:stretch/>
+        </p:blipFill>
+        <p:spPr>
+          <a:xfrm>
+            <a:off x="663145" y="46294"/>
+            <a:ext cx="3068908" cy="2797954"/>
+          </a:xfrm>
+          <a:prstGeom prst="rect">
+            <a:avLst/>
+          </a:prstGeom>
+        </p:spPr>
+      </p:pic>
+      <p:pic>
+        <p:nvPicPr>
+          <p:cNvPr id="22" name="Picture 21">
+            <a:extLst>
+              <a:ext uri="{FF2B5EF4-FFF2-40B4-BE49-F238E27FC236}">
+                <a16:creationId xmlns:a16="http://schemas.microsoft.com/office/drawing/2014/main" id="{9ED6D051-7D7E-73CD-67BE-B275737D8A66}"/>
+              </a:ext>
+            </a:extLst>
+          </p:cNvPr>
+          <p:cNvPicPr>
+            <a:picLocks noChangeAspect="1"/>
+          </p:cNvPicPr>
+          <p:nvPr/>
+        </p:nvPicPr>
+        <p:blipFill>
+          <a:blip r:embed="rId3"/>
+          <a:stretch>
+            <a:fillRect/>
+          </a:stretch>
+        </p:blipFill>
+        <p:spPr>
+          <a:xfrm>
+            <a:off x="502228" y="2947160"/>
+            <a:ext cx="4102311" cy="1352620"/>
+          </a:xfrm>
+          <a:prstGeom prst="rect">
+            <a:avLst/>
+          </a:prstGeom>
+        </p:spPr>
+      </p:pic>
+      <p:pic>
+        <p:nvPicPr>
+          <p:cNvPr id="24" name="Picture 23">
+            <a:extLst>
+              <a:ext uri="{FF2B5EF4-FFF2-40B4-BE49-F238E27FC236}">
+                <a16:creationId xmlns:a16="http://schemas.microsoft.com/office/drawing/2014/main" id="{98CE16BD-1323-60B5-3F3A-D8D1FACF61A3}"/>
+              </a:ext>
+            </a:extLst>
+          </p:cNvPr>
+          <p:cNvPicPr>
+            <a:picLocks noChangeAspect="1"/>
+          </p:cNvPicPr>
+          <p:nvPr/>
+        </p:nvPicPr>
+        <p:blipFill>
+          <a:blip r:embed="rId4"/>
+          <a:stretch>
+            <a:fillRect/>
+          </a:stretch>
+        </p:blipFill>
+        <p:spPr>
+          <a:xfrm>
+            <a:off x="4719976" y="178418"/>
+            <a:ext cx="4197566" cy="4121362"/>
+          </a:xfrm>
+          <a:prstGeom prst="rect">
+            <a:avLst/>
+          </a:prstGeom>
+        </p:spPr>
+      </p:pic>
+    </p:spTree>
+    <p:extLst>
+      <p:ext uri="{BB962C8B-B14F-4D97-AF65-F5344CB8AC3E}">
+        <p14:creationId xmlns:p14="http://schemas.microsoft.com/office/powerpoint/2010/main" val="1281866610"/>
+      </p:ext>
+    </p:extLst>
+  </p:cSld>
+  <p:clrMapOvr>
+    <a:masterClrMapping/>
+  </p:clrMapOvr>
+</p:sld>
+</file>
+
 <file path=ppt/theme/theme1.xml><?xml version="1.0" encoding="utf-8"?>
 <a:theme xmlns:a="http://schemas.openxmlformats.org/drawingml/2006/main" name="Office Theme">
   <a:themeElements>

</xml_diff>

<commit_message>
Interaction, formula evaluation, part 1
</commit_message>
<xml_diff>
--- a/fig/walkthrough.pptx
+++ b/fig/walkthrough.pptx
@@ -8,6 +8,9 @@
     <p:sldId id="256" r:id="rId2"/>
     <p:sldId id="257" r:id="rId3"/>
     <p:sldId id="258" r:id="rId4"/>
+    <p:sldId id="259" r:id="rId5"/>
+    <p:sldId id="261" r:id="rId6"/>
+    <p:sldId id="260" r:id="rId7"/>
   </p:sldIdLst>
   <p:sldSz cx="12192000" cy="6858000"/>
   <p:notesSz cx="6858000" cy="9144000"/>
@@ -263,7 +266,7 @@
           <a:p>
             <a:fld id="{BC7C423D-9102-402A-A9CF-B9852A18F701}" type="datetimeFigureOut">
               <a:rPr lang="en-GB" smtClean="0"/>
-              <a:t>08/11/2024</a:t>
+              <a:t>09/11/2024</a:t>
             </a:fld>
             <a:endParaRPr lang="en-GB"/>
           </a:p>
@@ -463,7 +466,7 @@
           <a:p>
             <a:fld id="{BC7C423D-9102-402A-A9CF-B9852A18F701}" type="datetimeFigureOut">
               <a:rPr lang="en-GB" smtClean="0"/>
-              <a:t>08/11/2024</a:t>
+              <a:t>09/11/2024</a:t>
             </a:fld>
             <a:endParaRPr lang="en-GB"/>
           </a:p>
@@ -673,7 +676,7 @@
           <a:p>
             <a:fld id="{BC7C423D-9102-402A-A9CF-B9852A18F701}" type="datetimeFigureOut">
               <a:rPr lang="en-GB" smtClean="0"/>
-              <a:t>08/11/2024</a:t>
+              <a:t>09/11/2024</a:t>
             </a:fld>
             <a:endParaRPr lang="en-GB"/>
           </a:p>
@@ -873,7 +876,7 @@
           <a:p>
             <a:fld id="{BC7C423D-9102-402A-A9CF-B9852A18F701}" type="datetimeFigureOut">
               <a:rPr lang="en-GB" smtClean="0"/>
-              <a:t>08/11/2024</a:t>
+              <a:t>09/11/2024</a:t>
             </a:fld>
             <a:endParaRPr lang="en-GB"/>
           </a:p>
@@ -1149,7 +1152,7 @@
           <a:p>
             <a:fld id="{BC7C423D-9102-402A-A9CF-B9852A18F701}" type="datetimeFigureOut">
               <a:rPr lang="en-GB" smtClean="0"/>
-              <a:t>08/11/2024</a:t>
+              <a:t>09/11/2024</a:t>
             </a:fld>
             <a:endParaRPr lang="en-GB"/>
           </a:p>
@@ -1417,7 +1420,7 @@
           <a:p>
             <a:fld id="{BC7C423D-9102-402A-A9CF-B9852A18F701}" type="datetimeFigureOut">
               <a:rPr lang="en-GB" smtClean="0"/>
-              <a:t>08/11/2024</a:t>
+              <a:t>09/11/2024</a:t>
             </a:fld>
             <a:endParaRPr lang="en-GB"/>
           </a:p>
@@ -1832,7 +1835,7 @@
           <a:p>
             <a:fld id="{BC7C423D-9102-402A-A9CF-B9852A18F701}" type="datetimeFigureOut">
               <a:rPr lang="en-GB" smtClean="0"/>
-              <a:t>08/11/2024</a:t>
+              <a:t>09/11/2024</a:t>
             </a:fld>
             <a:endParaRPr lang="en-GB"/>
           </a:p>
@@ -1974,7 +1977,7 @@
           <a:p>
             <a:fld id="{BC7C423D-9102-402A-A9CF-B9852A18F701}" type="datetimeFigureOut">
               <a:rPr lang="en-GB" smtClean="0"/>
-              <a:t>08/11/2024</a:t>
+              <a:t>09/11/2024</a:t>
             </a:fld>
             <a:endParaRPr lang="en-GB"/>
           </a:p>
@@ -2087,7 +2090,7 @@
           <a:p>
             <a:fld id="{BC7C423D-9102-402A-A9CF-B9852A18F701}" type="datetimeFigureOut">
               <a:rPr lang="en-GB" smtClean="0"/>
-              <a:t>08/11/2024</a:t>
+              <a:t>09/11/2024</a:t>
             </a:fld>
             <a:endParaRPr lang="en-GB"/>
           </a:p>
@@ -2400,7 +2403,7 @@
           <a:p>
             <a:fld id="{BC7C423D-9102-402A-A9CF-B9852A18F701}" type="datetimeFigureOut">
               <a:rPr lang="en-GB" smtClean="0"/>
-              <a:t>08/11/2024</a:t>
+              <a:t>09/11/2024</a:t>
             </a:fld>
             <a:endParaRPr lang="en-GB"/>
           </a:p>
@@ -2689,7 +2692,7 @@
           <a:p>
             <a:fld id="{BC7C423D-9102-402A-A9CF-B9852A18F701}" type="datetimeFigureOut">
               <a:rPr lang="en-GB" smtClean="0"/>
-              <a:t>08/11/2024</a:t>
+              <a:t>09/11/2024</a:t>
             </a:fld>
             <a:endParaRPr lang="en-GB"/>
           </a:p>
@@ -2932,7 +2935,7 @@
           <a:p>
             <a:fld id="{BC7C423D-9102-402A-A9CF-B9852A18F701}" type="datetimeFigureOut">
               <a:rPr lang="en-GB" smtClean="0"/>
-              <a:t>08/11/2024</a:t>
+              <a:t>09/11/2024</a:t>
             </a:fld>
             <a:endParaRPr lang="en-GB"/>
           </a:p>
@@ -5107,6 +5110,948 @@
 </p:sld>
 </file>
 
+<file path=ppt/slides/slide4.xml><?xml version="1.0" encoding="utf-8"?>
+<p:sld xmlns:a="http://schemas.openxmlformats.org/drawingml/2006/main" xmlns:r="http://schemas.openxmlformats.org/officeDocument/2006/relationships" xmlns:p="http://schemas.openxmlformats.org/presentationml/2006/main">
+  <p:cSld>
+    <p:spTree>
+      <p:nvGrpSpPr>
+        <p:cNvPr id="1" name=""/>
+        <p:cNvGrpSpPr/>
+        <p:nvPr/>
+      </p:nvGrpSpPr>
+      <p:grpSpPr>
+        <a:xfrm>
+          <a:off x="0" y="0"/>
+          <a:ext cx="0" cy="0"/>
+          <a:chOff x="0" y="0"/>
+          <a:chExt cx="0" cy="0"/>
+        </a:xfrm>
+      </p:grpSpPr>
+      <p:pic>
+        <p:nvPicPr>
+          <p:cNvPr id="13" name="Picture 12">
+            <a:extLst>
+              <a:ext uri="{FF2B5EF4-FFF2-40B4-BE49-F238E27FC236}">
+                <a16:creationId xmlns:a16="http://schemas.microsoft.com/office/drawing/2014/main" id="{B3D9DA7D-C581-F0A0-2531-B69C41D5F6F4}"/>
+              </a:ext>
+            </a:extLst>
+          </p:cNvPr>
+          <p:cNvPicPr>
+            <a:picLocks noChangeAspect="1"/>
+          </p:cNvPicPr>
+          <p:nvPr/>
+        </p:nvPicPr>
+        <p:blipFill>
+          <a:blip r:embed="rId2"/>
+          <a:srcRect r="55365" b="55800"/>
+          <a:stretch/>
+        </p:blipFill>
+        <p:spPr>
+          <a:xfrm>
+            <a:off x="242886" y="673512"/>
+            <a:ext cx="2443879" cy="1374232"/>
+          </a:xfrm>
+          <a:prstGeom prst="rect">
+            <a:avLst/>
+          </a:prstGeom>
+        </p:spPr>
+      </p:pic>
+      <p:pic>
+        <p:nvPicPr>
+          <p:cNvPr id="16" name="Picture 15">
+            <a:extLst>
+              <a:ext uri="{FF2B5EF4-FFF2-40B4-BE49-F238E27FC236}">
+                <a16:creationId xmlns:a16="http://schemas.microsoft.com/office/drawing/2014/main" id="{2944FC65-29D8-B560-6E19-1A40CB2DEC45}"/>
+              </a:ext>
+            </a:extLst>
+          </p:cNvPr>
+          <p:cNvPicPr>
+            <a:picLocks noChangeAspect="1"/>
+          </p:cNvPicPr>
+          <p:nvPr/>
+        </p:nvPicPr>
+        <p:blipFill>
+          <a:blip r:embed="rId2"/>
+          <a:srcRect l="28640" t="44783"/>
+          <a:stretch/>
+        </p:blipFill>
+        <p:spPr>
+          <a:xfrm>
+            <a:off x="203291" y="2097804"/>
+            <a:ext cx="3907139" cy="1716763"/>
+          </a:xfrm>
+          <a:prstGeom prst="rect">
+            <a:avLst/>
+          </a:prstGeom>
+        </p:spPr>
+      </p:pic>
+      <p:sp>
+        <p:nvSpPr>
+          <p:cNvPr id="17" name="Oval 16">
+            <a:extLst>
+              <a:ext uri="{FF2B5EF4-FFF2-40B4-BE49-F238E27FC236}">
+                <a16:creationId xmlns:a16="http://schemas.microsoft.com/office/drawing/2014/main" id="{E93AAA6B-FD98-44A2-A6E9-081CA60FDFC2}"/>
+              </a:ext>
+            </a:extLst>
+          </p:cNvPr>
+          <p:cNvSpPr/>
+          <p:nvPr/>
+        </p:nvSpPr>
+        <p:spPr>
+          <a:xfrm>
+            <a:off x="186273" y="278096"/>
+            <a:ext cx="395416" cy="395416"/>
+          </a:xfrm>
+          <a:prstGeom prst="ellipse">
+            <a:avLst/>
+          </a:prstGeom>
+          <a:solidFill>
+            <a:srgbClr val="831086"/>
+          </a:solidFill>
+          <a:ln>
+            <a:noFill/>
+          </a:ln>
+        </p:spPr>
+        <p:style>
+          <a:lnRef idx="2">
+            <a:schemeClr val="accent1">
+              <a:shade val="15000"/>
+            </a:schemeClr>
+          </a:lnRef>
+          <a:fillRef idx="1">
+            <a:schemeClr val="accent1"/>
+          </a:fillRef>
+          <a:effectRef idx="0">
+            <a:schemeClr val="accent1"/>
+          </a:effectRef>
+          <a:fontRef idx="minor">
+            <a:schemeClr val="lt1"/>
+          </a:fontRef>
+        </p:style>
+        <p:txBody>
+          <a:bodyPr rtlCol="0" anchor="ctr"/>
+          <a:lstStyle/>
+          <a:p>
+            <a:pPr algn="ctr"/>
+            <a:r>
+              <a:rPr lang="en-US" dirty="0">
+                <a:latin typeface="Roboto Black" panose="02000000000000000000" pitchFamily="2" charset="0"/>
+                <a:ea typeface="Roboto Black" panose="02000000000000000000" pitchFamily="2" charset="0"/>
+              </a:rPr>
+              <a:t>1</a:t>
+            </a:r>
+            <a:endParaRPr lang="en-GB" dirty="0">
+              <a:latin typeface="Roboto Black" panose="02000000000000000000" pitchFamily="2" charset="0"/>
+              <a:ea typeface="Roboto Black" panose="02000000000000000000" pitchFamily="2" charset="0"/>
+            </a:endParaRPr>
+          </a:p>
+        </p:txBody>
+      </p:sp>
+      <p:pic>
+        <p:nvPicPr>
+          <p:cNvPr id="19" name="Picture 18">
+            <a:extLst>
+              <a:ext uri="{FF2B5EF4-FFF2-40B4-BE49-F238E27FC236}">
+                <a16:creationId xmlns:a16="http://schemas.microsoft.com/office/drawing/2014/main" id="{540D88C1-BC4B-848F-3DEE-5C8A80E9D571}"/>
+              </a:ext>
+            </a:extLst>
+          </p:cNvPr>
+          <p:cNvPicPr>
+            <a:picLocks noChangeAspect="1"/>
+          </p:cNvPicPr>
+          <p:nvPr/>
+        </p:nvPicPr>
+        <p:blipFill>
+          <a:blip r:embed="rId3"/>
+          <a:srcRect l="736" t="16749" r="68432" b="49378"/>
+          <a:stretch/>
+        </p:blipFill>
+        <p:spPr>
+          <a:xfrm>
+            <a:off x="4110430" y="97559"/>
+            <a:ext cx="5074961" cy="3717008"/>
+          </a:xfrm>
+          <a:prstGeom prst="rect">
+            <a:avLst/>
+          </a:prstGeom>
+        </p:spPr>
+      </p:pic>
+      <p:sp>
+        <p:nvSpPr>
+          <p:cNvPr id="20" name="Oval 19">
+            <a:extLst>
+              <a:ext uri="{FF2B5EF4-FFF2-40B4-BE49-F238E27FC236}">
+                <a16:creationId xmlns:a16="http://schemas.microsoft.com/office/drawing/2014/main" id="{1A068DB7-C9A2-E1BF-7471-9C0959ADA10E}"/>
+              </a:ext>
+            </a:extLst>
+          </p:cNvPr>
+          <p:cNvSpPr/>
+          <p:nvPr/>
+        </p:nvSpPr>
+        <p:spPr>
+          <a:xfrm>
+            <a:off x="3462873" y="278096"/>
+            <a:ext cx="395416" cy="395416"/>
+          </a:xfrm>
+          <a:prstGeom prst="ellipse">
+            <a:avLst/>
+          </a:prstGeom>
+          <a:solidFill>
+            <a:srgbClr val="831086"/>
+          </a:solidFill>
+          <a:ln>
+            <a:noFill/>
+          </a:ln>
+        </p:spPr>
+        <p:style>
+          <a:lnRef idx="2">
+            <a:schemeClr val="accent1">
+              <a:shade val="15000"/>
+            </a:schemeClr>
+          </a:lnRef>
+          <a:fillRef idx="1">
+            <a:schemeClr val="accent1"/>
+          </a:fillRef>
+          <a:effectRef idx="0">
+            <a:schemeClr val="accent1"/>
+          </a:effectRef>
+          <a:fontRef idx="minor">
+            <a:schemeClr val="lt1"/>
+          </a:fontRef>
+        </p:style>
+        <p:txBody>
+          <a:bodyPr rtlCol="0" anchor="ctr"/>
+          <a:lstStyle/>
+          <a:p>
+            <a:pPr algn="ctr"/>
+            <a:r>
+              <a:rPr lang="en-US" dirty="0">
+                <a:latin typeface="Roboto Black" panose="02000000000000000000" pitchFamily="2" charset="0"/>
+                <a:ea typeface="Roboto Black" panose="02000000000000000000" pitchFamily="2" charset="0"/>
+              </a:rPr>
+              <a:t>2</a:t>
+            </a:r>
+            <a:endParaRPr lang="en-GB" dirty="0">
+              <a:latin typeface="Roboto Black" panose="02000000000000000000" pitchFamily="2" charset="0"/>
+              <a:ea typeface="Roboto Black" panose="02000000000000000000" pitchFamily="2" charset="0"/>
+            </a:endParaRPr>
+          </a:p>
+        </p:txBody>
+      </p:sp>
+    </p:spTree>
+    <p:extLst>
+      <p:ext uri="{BB962C8B-B14F-4D97-AF65-F5344CB8AC3E}">
+        <p14:creationId xmlns:p14="http://schemas.microsoft.com/office/powerpoint/2010/main" val="4145024606"/>
+      </p:ext>
+    </p:extLst>
+  </p:cSld>
+  <p:clrMapOvr>
+    <a:masterClrMapping/>
+  </p:clrMapOvr>
+</p:sld>
+</file>
+
+<file path=ppt/slides/slide5.xml><?xml version="1.0" encoding="utf-8"?>
+<p:sld xmlns:a="http://schemas.openxmlformats.org/drawingml/2006/main" xmlns:r="http://schemas.openxmlformats.org/officeDocument/2006/relationships" xmlns:p="http://schemas.openxmlformats.org/presentationml/2006/main">
+  <p:cSld>
+    <p:spTree>
+      <p:nvGrpSpPr>
+        <p:cNvPr id="1" name=""/>
+        <p:cNvGrpSpPr/>
+        <p:nvPr/>
+      </p:nvGrpSpPr>
+      <p:grpSpPr>
+        <a:xfrm>
+          <a:off x="0" y="0"/>
+          <a:ext cx="0" cy="0"/>
+          <a:chOff x="0" y="0"/>
+          <a:chExt cx="0" cy="0"/>
+        </a:xfrm>
+      </p:grpSpPr>
+      <p:pic>
+        <p:nvPicPr>
+          <p:cNvPr id="5" name="Picture 4">
+            <a:extLst>
+              <a:ext uri="{FF2B5EF4-FFF2-40B4-BE49-F238E27FC236}">
+                <a16:creationId xmlns:a16="http://schemas.microsoft.com/office/drawing/2014/main" id="{3A73A6CE-774C-2B45-95A7-E08CCAFD3F27}"/>
+              </a:ext>
+            </a:extLst>
+          </p:cNvPr>
+          <p:cNvPicPr>
+            <a:picLocks noChangeAspect="1"/>
+          </p:cNvPicPr>
+          <p:nvPr/>
+        </p:nvPicPr>
+        <p:blipFill>
+          <a:blip r:embed="rId2"/>
+          <a:stretch>
+            <a:fillRect/>
+          </a:stretch>
+        </p:blipFill>
+        <p:spPr>
+          <a:xfrm>
+            <a:off x="4956401" y="0"/>
+            <a:ext cx="4007056" cy="2197213"/>
+          </a:xfrm>
+          <a:prstGeom prst="rect">
+            <a:avLst/>
+          </a:prstGeom>
+        </p:spPr>
+      </p:pic>
+      <p:pic>
+        <p:nvPicPr>
+          <p:cNvPr id="9" name="Picture 8">
+            <a:extLst>
+              <a:ext uri="{FF2B5EF4-FFF2-40B4-BE49-F238E27FC236}">
+                <a16:creationId xmlns:a16="http://schemas.microsoft.com/office/drawing/2014/main" id="{24413612-2AA7-C745-CE1F-FDE3E97E05A5}"/>
+              </a:ext>
+            </a:extLst>
+          </p:cNvPr>
+          <p:cNvPicPr>
+            <a:picLocks noChangeAspect="1"/>
+          </p:cNvPicPr>
+          <p:nvPr/>
+        </p:nvPicPr>
+        <p:blipFill>
+          <a:blip r:embed="rId3"/>
+          <a:stretch>
+            <a:fillRect/>
+          </a:stretch>
+        </p:blipFill>
+        <p:spPr>
+          <a:xfrm>
+            <a:off x="512989" y="0"/>
+            <a:ext cx="3530781" cy="1378021"/>
+          </a:xfrm>
+          <a:prstGeom prst="rect">
+            <a:avLst/>
+          </a:prstGeom>
+        </p:spPr>
+      </p:pic>
+      <p:sp>
+        <p:nvSpPr>
+          <p:cNvPr id="12" name="Oval 11">
+            <a:extLst>
+              <a:ext uri="{FF2B5EF4-FFF2-40B4-BE49-F238E27FC236}">
+                <a16:creationId xmlns:a16="http://schemas.microsoft.com/office/drawing/2014/main" id="{12AF9E8A-40A7-721B-D6E2-62A046883413}"/>
+              </a:ext>
+            </a:extLst>
+          </p:cNvPr>
+          <p:cNvSpPr/>
+          <p:nvPr/>
+        </p:nvSpPr>
+        <p:spPr>
+          <a:xfrm>
+            <a:off x="56733" y="57116"/>
+            <a:ext cx="395416" cy="395416"/>
+          </a:xfrm>
+          <a:prstGeom prst="ellipse">
+            <a:avLst/>
+          </a:prstGeom>
+          <a:solidFill>
+            <a:srgbClr val="831086"/>
+          </a:solidFill>
+          <a:ln>
+            <a:noFill/>
+          </a:ln>
+        </p:spPr>
+        <p:style>
+          <a:lnRef idx="2">
+            <a:schemeClr val="accent1">
+              <a:shade val="15000"/>
+            </a:schemeClr>
+          </a:lnRef>
+          <a:fillRef idx="1">
+            <a:schemeClr val="accent1"/>
+          </a:fillRef>
+          <a:effectRef idx="0">
+            <a:schemeClr val="accent1"/>
+          </a:effectRef>
+          <a:fontRef idx="minor">
+            <a:schemeClr val="lt1"/>
+          </a:fontRef>
+        </p:style>
+        <p:txBody>
+          <a:bodyPr rtlCol="0" anchor="ctr"/>
+          <a:lstStyle/>
+          <a:p>
+            <a:pPr algn="ctr"/>
+            <a:r>
+              <a:rPr lang="en-US" dirty="0">
+                <a:latin typeface="Roboto Black" panose="02000000000000000000" pitchFamily="2" charset="0"/>
+                <a:ea typeface="Roboto Black" panose="02000000000000000000" pitchFamily="2" charset="0"/>
+              </a:rPr>
+              <a:t>1</a:t>
+            </a:r>
+            <a:endParaRPr lang="en-GB" dirty="0">
+              <a:latin typeface="Roboto Black" panose="02000000000000000000" pitchFamily="2" charset="0"/>
+              <a:ea typeface="Roboto Black" panose="02000000000000000000" pitchFamily="2" charset="0"/>
+            </a:endParaRPr>
+          </a:p>
+        </p:txBody>
+      </p:sp>
+      <p:sp>
+        <p:nvSpPr>
+          <p:cNvPr id="13" name="Oval 12">
+            <a:extLst>
+              <a:ext uri="{FF2B5EF4-FFF2-40B4-BE49-F238E27FC236}">
+                <a16:creationId xmlns:a16="http://schemas.microsoft.com/office/drawing/2014/main" id="{1230C6EE-1D8A-CFD2-82DB-67409E5F3DB9}"/>
+              </a:ext>
+            </a:extLst>
+          </p:cNvPr>
+          <p:cNvSpPr/>
+          <p:nvPr/>
+        </p:nvSpPr>
+        <p:spPr>
+          <a:xfrm>
+            <a:off x="56733" y="1817343"/>
+            <a:ext cx="395416" cy="395416"/>
+          </a:xfrm>
+          <a:prstGeom prst="ellipse">
+            <a:avLst/>
+          </a:prstGeom>
+          <a:solidFill>
+            <a:srgbClr val="831086"/>
+          </a:solidFill>
+          <a:ln>
+            <a:noFill/>
+          </a:ln>
+        </p:spPr>
+        <p:style>
+          <a:lnRef idx="2">
+            <a:schemeClr val="accent1">
+              <a:shade val="15000"/>
+            </a:schemeClr>
+          </a:lnRef>
+          <a:fillRef idx="1">
+            <a:schemeClr val="accent1"/>
+          </a:fillRef>
+          <a:effectRef idx="0">
+            <a:schemeClr val="accent1"/>
+          </a:effectRef>
+          <a:fontRef idx="minor">
+            <a:schemeClr val="lt1"/>
+          </a:fontRef>
+        </p:style>
+        <p:txBody>
+          <a:bodyPr rtlCol="0" anchor="ctr"/>
+          <a:lstStyle/>
+          <a:p>
+            <a:pPr algn="ctr"/>
+            <a:r>
+              <a:rPr lang="en-US" dirty="0">
+                <a:latin typeface="Roboto Black" panose="02000000000000000000" pitchFamily="2" charset="0"/>
+                <a:ea typeface="Roboto Black" panose="02000000000000000000" pitchFamily="2" charset="0"/>
+              </a:rPr>
+              <a:t>3</a:t>
+            </a:r>
+            <a:endParaRPr lang="en-GB" dirty="0">
+              <a:latin typeface="Roboto Black" panose="02000000000000000000" pitchFamily="2" charset="0"/>
+              <a:ea typeface="Roboto Black" panose="02000000000000000000" pitchFamily="2" charset="0"/>
+            </a:endParaRPr>
+          </a:p>
+        </p:txBody>
+      </p:sp>
+      <p:sp>
+        <p:nvSpPr>
+          <p:cNvPr id="14" name="Oval 13">
+            <a:extLst>
+              <a:ext uri="{FF2B5EF4-FFF2-40B4-BE49-F238E27FC236}">
+                <a16:creationId xmlns:a16="http://schemas.microsoft.com/office/drawing/2014/main" id="{34980906-7F5F-ECC9-9D12-FE8281B09FEC}"/>
+              </a:ext>
+            </a:extLst>
+          </p:cNvPr>
+          <p:cNvSpPr/>
+          <p:nvPr/>
+        </p:nvSpPr>
+        <p:spPr>
+          <a:xfrm>
+            <a:off x="4560985" y="2320293"/>
+            <a:ext cx="395416" cy="395416"/>
+          </a:xfrm>
+          <a:prstGeom prst="ellipse">
+            <a:avLst/>
+          </a:prstGeom>
+          <a:solidFill>
+            <a:srgbClr val="831086"/>
+          </a:solidFill>
+          <a:ln>
+            <a:noFill/>
+          </a:ln>
+        </p:spPr>
+        <p:style>
+          <a:lnRef idx="2">
+            <a:schemeClr val="accent1">
+              <a:shade val="15000"/>
+            </a:schemeClr>
+          </a:lnRef>
+          <a:fillRef idx="1">
+            <a:schemeClr val="accent1"/>
+          </a:fillRef>
+          <a:effectRef idx="0">
+            <a:schemeClr val="accent1"/>
+          </a:effectRef>
+          <a:fontRef idx="minor">
+            <a:schemeClr val="lt1"/>
+          </a:fontRef>
+        </p:style>
+        <p:txBody>
+          <a:bodyPr rtlCol="0" anchor="ctr"/>
+          <a:lstStyle/>
+          <a:p>
+            <a:pPr algn="ctr"/>
+            <a:r>
+              <a:rPr lang="en-US" dirty="0">
+                <a:latin typeface="Roboto Black" panose="02000000000000000000" pitchFamily="2" charset="0"/>
+                <a:ea typeface="Roboto Black" panose="02000000000000000000" pitchFamily="2" charset="0"/>
+              </a:rPr>
+              <a:t>4</a:t>
+            </a:r>
+            <a:endParaRPr lang="en-GB" dirty="0">
+              <a:latin typeface="Roboto Black" panose="02000000000000000000" pitchFamily="2" charset="0"/>
+              <a:ea typeface="Roboto Black" panose="02000000000000000000" pitchFamily="2" charset="0"/>
+            </a:endParaRPr>
+          </a:p>
+        </p:txBody>
+      </p:sp>
+      <p:sp>
+        <p:nvSpPr>
+          <p:cNvPr id="15" name="Oval 14">
+            <a:extLst>
+              <a:ext uri="{FF2B5EF4-FFF2-40B4-BE49-F238E27FC236}">
+                <a16:creationId xmlns:a16="http://schemas.microsoft.com/office/drawing/2014/main" id="{3B0C2AB5-8022-13B9-9E94-E0F7B02EC923}"/>
+              </a:ext>
+            </a:extLst>
+          </p:cNvPr>
+          <p:cNvSpPr/>
+          <p:nvPr/>
+        </p:nvSpPr>
+        <p:spPr>
+          <a:xfrm>
+            <a:off x="4560985" y="57116"/>
+            <a:ext cx="395416" cy="395416"/>
+          </a:xfrm>
+          <a:prstGeom prst="ellipse">
+            <a:avLst/>
+          </a:prstGeom>
+          <a:solidFill>
+            <a:srgbClr val="831086"/>
+          </a:solidFill>
+          <a:ln>
+            <a:noFill/>
+          </a:ln>
+        </p:spPr>
+        <p:style>
+          <a:lnRef idx="2">
+            <a:schemeClr val="accent1">
+              <a:shade val="15000"/>
+            </a:schemeClr>
+          </a:lnRef>
+          <a:fillRef idx="1">
+            <a:schemeClr val="accent1"/>
+          </a:fillRef>
+          <a:effectRef idx="0">
+            <a:schemeClr val="accent1"/>
+          </a:effectRef>
+          <a:fontRef idx="minor">
+            <a:schemeClr val="lt1"/>
+          </a:fontRef>
+        </p:style>
+        <p:txBody>
+          <a:bodyPr rtlCol="0" anchor="ctr"/>
+          <a:lstStyle/>
+          <a:p>
+            <a:pPr algn="ctr"/>
+            <a:r>
+              <a:rPr lang="en-US" dirty="0">
+                <a:latin typeface="Roboto Black" panose="02000000000000000000" pitchFamily="2" charset="0"/>
+                <a:ea typeface="Roboto Black" panose="02000000000000000000" pitchFamily="2" charset="0"/>
+              </a:rPr>
+              <a:t>2</a:t>
+            </a:r>
+            <a:endParaRPr lang="en-GB" dirty="0">
+              <a:latin typeface="Roboto Black" panose="02000000000000000000" pitchFamily="2" charset="0"/>
+              <a:ea typeface="Roboto Black" panose="02000000000000000000" pitchFamily="2" charset="0"/>
+            </a:endParaRPr>
+          </a:p>
+        </p:txBody>
+      </p:sp>
+      <p:pic>
+        <p:nvPicPr>
+          <p:cNvPr id="17" name="Picture 16">
+            <a:extLst>
+              <a:ext uri="{FF2B5EF4-FFF2-40B4-BE49-F238E27FC236}">
+                <a16:creationId xmlns:a16="http://schemas.microsoft.com/office/drawing/2014/main" id="{AF822C1C-AABB-00C8-8378-494E75D6BF5D}"/>
+              </a:ext>
+            </a:extLst>
+          </p:cNvPr>
+          <p:cNvPicPr>
+            <a:picLocks noChangeAspect="1"/>
+          </p:cNvPicPr>
+          <p:nvPr/>
+        </p:nvPicPr>
+        <p:blipFill>
+          <a:blip r:embed="rId4"/>
+          <a:stretch>
+            <a:fillRect/>
+          </a:stretch>
+        </p:blipFill>
+        <p:spPr>
+          <a:xfrm>
+            <a:off x="512989" y="1741137"/>
+            <a:ext cx="3892750" cy="2559182"/>
+          </a:xfrm>
+          <a:prstGeom prst="rect">
+            <a:avLst/>
+          </a:prstGeom>
+        </p:spPr>
+      </p:pic>
+      <p:pic>
+        <p:nvPicPr>
+          <p:cNvPr id="29" name="Picture 28">
+            <a:extLst>
+              <a:ext uri="{FF2B5EF4-FFF2-40B4-BE49-F238E27FC236}">
+                <a16:creationId xmlns:a16="http://schemas.microsoft.com/office/drawing/2014/main" id="{CA6E2549-4A1B-ECEC-DEAB-2607A6F27E2B}"/>
+              </a:ext>
+            </a:extLst>
+          </p:cNvPr>
+          <p:cNvPicPr>
+            <a:picLocks noChangeAspect="1"/>
+          </p:cNvPicPr>
+          <p:nvPr/>
+        </p:nvPicPr>
+        <p:blipFill>
+          <a:blip r:embed="rId5"/>
+          <a:stretch>
+            <a:fillRect/>
+          </a:stretch>
+        </p:blipFill>
+        <p:spPr>
+          <a:xfrm>
+            <a:off x="4995880" y="2271339"/>
+            <a:ext cx="4045158" cy="2178162"/>
+          </a:xfrm>
+          <a:prstGeom prst="rect">
+            <a:avLst/>
+          </a:prstGeom>
+        </p:spPr>
+      </p:pic>
+    </p:spTree>
+    <p:extLst>
+      <p:ext uri="{BB962C8B-B14F-4D97-AF65-F5344CB8AC3E}">
+        <p14:creationId xmlns:p14="http://schemas.microsoft.com/office/powerpoint/2010/main" val="3598287413"/>
+      </p:ext>
+    </p:extLst>
+  </p:cSld>
+  <p:clrMapOvr>
+    <a:masterClrMapping/>
+  </p:clrMapOvr>
+</p:sld>
+</file>
+
+<file path=ppt/slides/slide6.xml><?xml version="1.0" encoding="utf-8"?>
+<p:sld xmlns:a="http://schemas.openxmlformats.org/drawingml/2006/main" xmlns:r="http://schemas.openxmlformats.org/officeDocument/2006/relationships" xmlns:p="http://schemas.openxmlformats.org/presentationml/2006/main">
+  <p:cSld>
+    <p:spTree>
+      <p:nvGrpSpPr>
+        <p:cNvPr id="1" name=""/>
+        <p:cNvGrpSpPr/>
+        <p:nvPr/>
+      </p:nvGrpSpPr>
+      <p:grpSpPr>
+        <a:xfrm>
+          <a:off x="0" y="0"/>
+          <a:ext cx="0" cy="0"/>
+          <a:chOff x="0" y="0"/>
+          <a:chExt cx="0" cy="0"/>
+        </a:xfrm>
+      </p:grpSpPr>
+      <p:sp>
+        <p:nvSpPr>
+          <p:cNvPr id="14" name="Oval 13">
+            <a:extLst>
+              <a:ext uri="{FF2B5EF4-FFF2-40B4-BE49-F238E27FC236}">
+                <a16:creationId xmlns:a16="http://schemas.microsoft.com/office/drawing/2014/main" id="{F55F8D43-0425-7832-C71D-A43EABBF0D98}"/>
+              </a:ext>
+            </a:extLst>
+          </p:cNvPr>
+          <p:cNvSpPr/>
+          <p:nvPr/>
+        </p:nvSpPr>
+        <p:spPr>
+          <a:xfrm>
+            <a:off x="38512" y="64736"/>
+            <a:ext cx="395416" cy="395416"/>
+          </a:xfrm>
+          <a:prstGeom prst="ellipse">
+            <a:avLst/>
+          </a:prstGeom>
+          <a:solidFill>
+            <a:srgbClr val="831086"/>
+          </a:solidFill>
+          <a:ln>
+            <a:noFill/>
+          </a:ln>
+        </p:spPr>
+        <p:style>
+          <a:lnRef idx="2">
+            <a:schemeClr val="accent1">
+              <a:shade val="15000"/>
+            </a:schemeClr>
+          </a:lnRef>
+          <a:fillRef idx="1">
+            <a:schemeClr val="accent1"/>
+          </a:fillRef>
+          <a:effectRef idx="0">
+            <a:schemeClr val="accent1"/>
+          </a:effectRef>
+          <a:fontRef idx="minor">
+            <a:schemeClr val="lt1"/>
+          </a:fontRef>
+        </p:style>
+        <p:txBody>
+          <a:bodyPr rtlCol="0" anchor="ctr"/>
+          <a:lstStyle/>
+          <a:p>
+            <a:pPr algn="ctr"/>
+            <a:r>
+              <a:rPr lang="en-US" dirty="0">
+                <a:latin typeface="Roboto Black" panose="02000000000000000000" pitchFamily="2" charset="0"/>
+                <a:ea typeface="Roboto Black" panose="02000000000000000000" pitchFamily="2" charset="0"/>
+              </a:rPr>
+              <a:t>1</a:t>
+            </a:r>
+            <a:endParaRPr lang="en-GB" dirty="0">
+              <a:latin typeface="Roboto Black" panose="02000000000000000000" pitchFamily="2" charset="0"/>
+              <a:ea typeface="Roboto Black" panose="02000000000000000000" pitchFamily="2" charset="0"/>
+            </a:endParaRPr>
+          </a:p>
+        </p:txBody>
+      </p:sp>
+      <p:pic>
+        <p:nvPicPr>
+          <p:cNvPr id="21" name="Picture 20">
+            <a:extLst>
+              <a:ext uri="{FF2B5EF4-FFF2-40B4-BE49-F238E27FC236}">
+                <a16:creationId xmlns:a16="http://schemas.microsoft.com/office/drawing/2014/main" id="{7796A598-2E2D-7DB7-DBF5-74C9BB2B780E}"/>
+              </a:ext>
+            </a:extLst>
+          </p:cNvPr>
+          <p:cNvPicPr>
+            <a:picLocks noChangeAspect="1"/>
+          </p:cNvPicPr>
+          <p:nvPr/>
+        </p:nvPicPr>
+        <p:blipFill>
+          <a:blip r:embed="rId2"/>
+          <a:srcRect l="519" t="16444" r="74296" b="37889"/>
+          <a:stretch/>
+        </p:blipFill>
+        <p:spPr>
+          <a:xfrm>
+            <a:off x="0" y="548640"/>
+            <a:ext cx="3684856" cy="4454406"/>
+          </a:xfrm>
+          <a:prstGeom prst="rect">
+            <a:avLst/>
+          </a:prstGeom>
+        </p:spPr>
+      </p:pic>
+      <p:pic>
+        <p:nvPicPr>
+          <p:cNvPr id="22" name="Picture 21">
+            <a:extLst>
+              <a:ext uri="{FF2B5EF4-FFF2-40B4-BE49-F238E27FC236}">
+                <a16:creationId xmlns:a16="http://schemas.microsoft.com/office/drawing/2014/main" id="{B5245589-CBB2-A444-6B26-DE76E7379FA0}"/>
+              </a:ext>
+            </a:extLst>
+          </p:cNvPr>
+          <p:cNvPicPr>
+            <a:picLocks noChangeAspect="1"/>
+          </p:cNvPicPr>
+          <p:nvPr/>
+        </p:nvPicPr>
+        <p:blipFill>
+          <a:blip r:embed="rId3"/>
+          <a:srcRect l="519" t="16445" r="76889" b="46556"/>
+          <a:stretch/>
+        </p:blipFill>
+        <p:spPr>
+          <a:xfrm>
+            <a:off x="3684856" y="548640"/>
+            <a:ext cx="3305470" cy="3608920"/>
+          </a:xfrm>
+          <a:prstGeom prst="rect">
+            <a:avLst/>
+          </a:prstGeom>
+        </p:spPr>
+      </p:pic>
+      <p:sp>
+        <p:nvSpPr>
+          <p:cNvPr id="15" name="Oval 14">
+            <a:extLst>
+              <a:ext uri="{FF2B5EF4-FFF2-40B4-BE49-F238E27FC236}">
+                <a16:creationId xmlns:a16="http://schemas.microsoft.com/office/drawing/2014/main" id="{798EDC67-3355-DD83-3BA8-3842DFA6E804}"/>
+              </a:ext>
+            </a:extLst>
+          </p:cNvPr>
+          <p:cNvSpPr/>
+          <p:nvPr/>
+        </p:nvSpPr>
+        <p:spPr>
+          <a:xfrm>
+            <a:off x="3712112" y="64736"/>
+            <a:ext cx="395416" cy="395416"/>
+          </a:xfrm>
+          <a:prstGeom prst="ellipse">
+            <a:avLst/>
+          </a:prstGeom>
+          <a:solidFill>
+            <a:srgbClr val="831086"/>
+          </a:solidFill>
+          <a:ln>
+            <a:noFill/>
+          </a:ln>
+        </p:spPr>
+        <p:style>
+          <a:lnRef idx="2">
+            <a:schemeClr val="accent1">
+              <a:shade val="15000"/>
+            </a:schemeClr>
+          </a:lnRef>
+          <a:fillRef idx="1">
+            <a:schemeClr val="accent1"/>
+          </a:fillRef>
+          <a:effectRef idx="0">
+            <a:schemeClr val="accent1"/>
+          </a:effectRef>
+          <a:fontRef idx="minor">
+            <a:schemeClr val="lt1"/>
+          </a:fontRef>
+        </p:style>
+        <p:txBody>
+          <a:bodyPr rtlCol="0" anchor="ctr"/>
+          <a:lstStyle/>
+          <a:p>
+            <a:pPr algn="ctr"/>
+            <a:r>
+              <a:rPr lang="en-US" dirty="0">
+                <a:latin typeface="Roboto Black" panose="02000000000000000000" pitchFamily="2" charset="0"/>
+                <a:ea typeface="Roboto Black" panose="02000000000000000000" pitchFamily="2" charset="0"/>
+              </a:rPr>
+              <a:t>2</a:t>
+            </a:r>
+            <a:endParaRPr lang="en-GB" dirty="0">
+              <a:latin typeface="Roboto Black" panose="02000000000000000000" pitchFamily="2" charset="0"/>
+              <a:ea typeface="Roboto Black" panose="02000000000000000000" pitchFamily="2" charset="0"/>
+            </a:endParaRPr>
+          </a:p>
+        </p:txBody>
+      </p:sp>
+      <p:sp>
+        <p:nvSpPr>
+          <p:cNvPr id="16" name="Oval 15">
+            <a:extLst>
+              <a:ext uri="{FF2B5EF4-FFF2-40B4-BE49-F238E27FC236}">
+                <a16:creationId xmlns:a16="http://schemas.microsoft.com/office/drawing/2014/main" id="{B7A45A65-E7CE-E484-F544-5BFEAD8A7F85}"/>
+              </a:ext>
+            </a:extLst>
+          </p:cNvPr>
+          <p:cNvSpPr/>
+          <p:nvPr/>
+        </p:nvSpPr>
+        <p:spPr>
+          <a:xfrm>
+            <a:off x="6709269" y="64736"/>
+            <a:ext cx="395416" cy="395416"/>
+          </a:xfrm>
+          <a:prstGeom prst="ellipse">
+            <a:avLst/>
+          </a:prstGeom>
+          <a:solidFill>
+            <a:srgbClr val="831086"/>
+          </a:solidFill>
+          <a:ln>
+            <a:noFill/>
+          </a:ln>
+        </p:spPr>
+        <p:style>
+          <a:lnRef idx="2">
+            <a:schemeClr val="accent1">
+              <a:shade val="15000"/>
+            </a:schemeClr>
+          </a:lnRef>
+          <a:fillRef idx="1">
+            <a:schemeClr val="accent1"/>
+          </a:fillRef>
+          <a:effectRef idx="0">
+            <a:schemeClr val="accent1"/>
+          </a:effectRef>
+          <a:fontRef idx="minor">
+            <a:schemeClr val="lt1"/>
+          </a:fontRef>
+        </p:style>
+        <p:txBody>
+          <a:bodyPr rtlCol="0" anchor="ctr"/>
+          <a:lstStyle/>
+          <a:p>
+            <a:pPr algn="ctr"/>
+            <a:r>
+              <a:rPr lang="en-US" dirty="0">
+                <a:latin typeface="Roboto Black" panose="02000000000000000000" pitchFamily="2" charset="0"/>
+                <a:ea typeface="Roboto Black" panose="02000000000000000000" pitchFamily="2" charset="0"/>
+              </a:rPr>
+              <a:t>3</a:t>
+            </a:r>
+            <a:endParaRPr lang="en-GB" dirty="0">
+              <a:latin typeface="Roboto Black" panose="02000000000000000000" pitchFamily="2" charset="0"/>
+              <a:ea typeface="Roboto Black" panose="02000000000000000000" pitchFamily="2" charset="0"/>
+            </a:endParaRPr>
+          </a:p>
+        </p:txBody>
+      </p:sp>
+      <p:pic>
+        <p:nvPicPr>
+          <p:cNvPr id="13" name="Picture 12">
+            <a:extLst>
+              <a:ext uri="{FF2B5EF4-FFF2-40B4-BE49-F238E27FC236}">
+                <a16:creationId xmlns:a16="http://schemas.microsoft.com/office/drawing/2014/main" id="{B99E9EFD-BC05-23B3-7F80-7FCBF28A339E}"/>
+              </a:ext>
+            </a:extLst>
+          </p:cNvPr>
+          <p:cNvPicPr>
+            <a:picLocks noChangeAspect="1"/>
+          </p:cNvPicPr>
+          <p:nvPr/>
+        </p:nvPicPr>
+        <p:blipFill>
+          <a:blip r:embed="rId4"/>
+          <a:srcRect l="518" t="17000" r="73778" b="42079"/>
+          <a:stretch/>
+        </p:blipFill>
+        <p:spPr>
+          <a:xfrm>
+            <a:off x="6709269" y="588827"/>
+            <a:ext cx="3760791" cy="3991476"/>
+          </a:xfrm>
+          <a:prstGeom prst="rect">
+            <a:avLst/>
+          </a:prstGeom>
+        </p:spPr>
+      </p:pic>
+    </p:spTree>
+    <p:extLst>
+      <p:ext uri="{BB962C8B-B14F-4D97-AF65-F5344CB8AC3E}">
+        <p14:creationId xmlns:p14="http://schemas.microsoft.com/office/powerpoint/2010/main" val="881539345"/>
+      </p:ext>
+    </p:extLst>
+  </p:cSld>
+  <p:clrMapOvr>
+    <a:masterClrMapping/>
+  </p:clrMapOvr>
+</p:sld>
+</file>
+
 <file path=ppt/theme/theme1.xml><?xml version="1.0" encoding="utf-8"?>
 <a:theme xmlns:a="http://schemas.openxmlformats.org/drawingml/2006/main" name="Office Theme">
   <a:themeElements>

</xml_diff>